<commit_message>
Edits, adjustments, finalizing code
</commit_message>
<xml_diff>
--- a/Figures/Labeled_figs_ch2.pptx
+++ b/Figures/Labeled_figs_ch2.pptx
@@ -199,7 +199,7 @@
           <a:p>
             <a:fld id="{36DF087B-7CE7-4703-81B3-6E379115899F}" type="datetimeFigureOut">
               <a:rPr lang="en-US" smtClean="0"/>
-              <a:t>2/17/2022</a:t>
+              <a:t>4/28/2022</a:t>
             </a:fld>
             <a:endParaRPr lang="en-US"/>
           </a:p>
@@ -689,7 +689,7 @@
           <a:p>
             <a:fld id="{40C51A13-D505-41E6-8CFC-F5EB90D4DA54}" type="datetimeFigureOut">
               <a:rPr lang="en-US" smtClean="0"/>
-              <a:t>2/17/2022</a:t>
+              <a:t>4/28/2022</a:t>
             </a:fld>
             <a:endParaRPr lang="en-US"/>
           </a:p>
@@ -859,7 +859,7 @@
           <a:p>
             <a:fld id="{40C51A13-D505-41E6-8CFC-F5EB90D4DA54}" type="datetimeFigureOut">
               <a:rPr lang="en-US" smtClean="0"/>
-              <a:t>2/17/2022</a:t>
+              <a:t>4/28/2022</a:t>
             </a:fld>
             <a:endParaRPr lang="en-US"/>
           </a:p>
@@ -1039,7 +1039,7 @@
           <a:p>
             <a:fld id="{40C51A13-D505-41E6-8CFC-F5EB90D4DA54}" type="datetimeFigureOut">
               <a:rPr lang="en-US" smtClean="0"/>
-              <a:t>2/17/2022</a:t>
+              <a:t>4/28/2022</a:t>
             </a:fld>
             <a:endParaRPr lang="en-US"/>
           </a:p>
@@ -1209,7 +1209,7 @@
           <a:p>
             <a:fld id="{40C51A13-D505-41E6-8CFC-F5EB90D4DA54}" type="datetimeFigureOut">
               <a:rPr lang="en-US" smtClean="0"/>
-              <a:t>2/17/2022</a:t>
+              <a:t>4/28/2022</a:t>
             </a:fld>
             <a:endParaRPr lang="en-US"/>
           </a:p>
@@ -1453,7 +1453,7 @@
           <a:p>
             <a:fld id="{40C51A13-D505-41E6-8CFC-F5EB90D4DA54}" type="datetimeFigureOut">
               <a:rPr lang="en-US" smtClean="0"/>
-              <a:t>2/17/2022</a:t>
+              <a:t>4/28/2022</a:t>
             </a:fld>
             <a:endParaRPr lang="en-US"/>
           </a:p>
@@ -1685,7 +1685,7 @@
           <a:p>
             <a:fld id="{40C51A13-D505-41E6-8CFC-F5EB90D4DA54}" type="datetimeFigureOut">
               <a:rPr lang="en-US" smtClean="0"/>
-              <a:t>2/17/2022</a:t>
+              <a:t>4/28/2022</a:t>
             </a:fld>
             <a:endParaRPr lang="en-US"/>
           </a:p>
@@ -2052,7 +2052,7 @@
           <a:p>
             <a:fld id="{40C51A13-D505-41E6-8CFC-F5EB90D4DA54}" type="datetimeFigureOut">
               <a:rPr lang="en-US" smtClean="0"/>
-              <a:t>2/17/2022</a:t>
+              <a:t>4/28/2022</a:t>
             </a:fld>
             <a:endParaRPr lang="en-US"/>
           </a:p>
@@ -2170,7 +2170,7 @@
           <a:p>
             <a:fld id="{40C51A13-D505-41E6-8CFC-F5EB90D4DA54}" type="datetimeFigureOut">
               <a:rPr lang="en-US" smtClean="0"/>
-              <a:t>2/17/2022</a:t>
+              <a:t>4/28/2022</a:t>
             </a:fld>
             <a:endParaRPr lang="en-US"/>
           </a:p>
@@ -2265,7 +2265,7 @@
           <a:p>
             <a:fld id="{40C51A13-D505-41E6-8CFC-F5EB90D4DA54}" type="datetimeFigureOut">
               <a:rPr lang="en-US" smtClean="0"/>
-              <a:t>2/17/2022</a:t>
+              <a:t>4/28/2022</a:t>
             </a:fld>
             <a:endParaRPr lang="en-US"/>
           </a:p>
@@ -2542,7 +2542,7 @@
           <a:p>
             <a:fld id="{40C51A13-D505-41E6-8CFC-F5EB90D4DA54}" type="datetimeFigureOut">
               <a:rPr lang="en-US" smtClean="0"/>
-              <a:t>2/17/2022</a:t>
+              <a:t>4/28/2022</a:t>
             </a:fld>
             <a:endParaRPr lang="en-US"/>
           </a:p>
@@ -2799,7 +2799,7 @@
           <a:p>
             <a:fld id="{40C51A13-D505-41E6-8CFC-F5EB90D4DA54}" type="datetimeFigureOut">
               <a:rPr lang="en-US" smtClean="0"/>
-              <a:t>2/17/2022</a:t>
+              <a:t>4/28/2022</a:t>
             </a:fld>
             <a:endParaRPr lang="en-US"/>
           </a:p>
@@ -3012,7 +3012,7 @@
           <a:p>
             <a:fld id="{40C51A13-D505-41E6-8CFC-F5EB90D4DA54}" type="datetimeFigureOut">
               <a:rPr lang="en-US" smtClean="0"/>
-              <a:t>2/17/2022</a:t>
+              <a:t>4/28/2022</a:t>
             </a:fld>
             <a:endParaRPr lang="en-US"/>
           </a:p>

</xml_diff>